<commit_message>
feat: Add script to generate Ansible Advanced Presentation from HTML sources.
</commit_message>
<xml_diff>
--- a/docs/03_Training_Materials/Ansible_Advanced_Presentation.pptx
+++ b/docs/03_Training_Materials/Ansible_Advanced_Presentation.pptx
@@ -1596,8 +1596,8 @@
         </p:nvSpPr>
         <p:spPr>
           <a:xfrm>
-            <a:off x="3084016" y="3562052"/>
-            <a:ext cx="3035487" cy="352425"/>
+            <a:off x="3609231" y="3562052"/>
+            <a:ext cx="1964049" cy="352425"/>
           </a:xfrm>
           <a:prstGeom prst="rect">
             <a:avLst/>
@@ -1627,7 +1627,7 @@
                 <a:ea typeface="Arial" pitchFamily="34" charset="-122"/>
                 <a:cs typeface="Arial" pitchFamily="34" charset="-120"/>
               </a:rPr>
-              <a:t>Cathay DevOps Team</a:t>
+              <a:t>DevOps Team</a:t>
             </a:r>
             <a:endParaRPr lang="en-US" sz="2400" dirty="0"/>
           </a:p>

</xml_diff>